<commit_message>
striped out screen shots of web pages
</commit_message>
<xml_diff>
--- a/Inventory Management System final code review.pptx
+++ b/Inventory Management System final code review.pptx
@@ -8,20 +8,13 @@
     <p:sldId id="256" r:id="rId2"/>
     <p:sldId id="257" r:id="rId3"/>
     <p:sldId id="258" r:id="rId4"/>
-    <p:sldId id="261" r:id="rId5"/>
-    <p:sldId id="263" r:id="rId6"/>
-    <p:sldId id="262" r:id="rId7"/>
-    <p:sldId id="264" r:id="rId8"/>
-    <p:sldId id="265" r:id="rId9"/>
-    <p:sldId id="266" r:id="rId10"/>
-    <p:sldId id="267" r:id="rId11"/>
-    <p:sldId id="259" r:id="rId12"/>
-    <p:sldId id="268" r:id="rId13"/>
-    <p:sldId id="269" r:id="rId14"/>
-    <p:sldId id="270" r:id="rId15"/>
-    <p:sldId id="260" r:id="rId16"/>
-    <p:sldId id="272" r:id="rId17"/>
-    <p:sldId id="271" r:id="rId18"/>
+    <p:sldId id="259" r:id="rId5"/>
+    <p:sldId id="268" r:id="rId6"/>
+    <p:sldId id="269" r:id="rId7"/>
+    <p:sldId id="270" r:id="rId8"/>
+    <p:sldId id="260" r:id="rId9"/>
+    <p:sldId id="272" r:id="rId10"/>
+    <p:sldId id="271" r:id="rId11"/>
   </p:sldIdLst>
   <p:sldSz cx="12192000" cy="6858000"/>
   <p:notesSz cx="6858000" cy="9144000"/>
@@ -6115,40 +6108,45 @@
           <a:chExt cx="0" cy="0"/>
         </a:xfrm>
       </p:grpSpPr>
-      <p:pic>
-        <p:nvPicPr>
-          <p:cNvPr id="3" name="Picture 2" descr="A screenshot of a cell phone&#10;&#10;Description generated with very high confidence">
+      <p:sp>
+        <p:nvSpPr>
+          <p:cNvPr id="2" name="TextBox 1">
             <a:extLst>
               <a:ext uri="{FF2B5EF4-FFF2-40B4-BE49-F238E27FC236}">
-                <a16:creationId xmlns:a16="http://schemas.microsoft.com/office/drawing/2014/main" id="{EC03C0FF-32A8-43B3-BC1D-C427AFE91C0B}"/>
+                <a16:creationId xmlns:a16="http://schemas.microsoft.com/office/drawing/2014/main" id="{EAB9DF37-18D9-437E-96E1-BB97F36140D0}"/>
               </a:ext>
             </a:extLst>
           </p:cNvPr>
-          <p:cNvPicPr>
-            <a:picLocks noChangeAspect="1"/>
-          </p:cNvPicPr>
+          <p:cNvSpPr txBox="1"/>
           <p:nvPr/>
-        </p:nvPicPr>
-        <p:blipFill>
-          <a:blip r:embed="rId2"/>
-          <a:stretch>
-            <a:fillRect/>
-          </a:stretch>
-        </p:blipFill>
+        </p:nvSpPr>
         <p:spPr>
           <a:xfrm>
-            <a:off x="1380467" y="609206"/>
-            <a:ext cx="9431066" cy="5639587"/>
+            <a:off x="4883969" y="3244334"/>
+            <a:ext cx="2424062" cy="369332"/>
           </a:xfrm>
           <a:prstGeom prst="rect">
             <a:avLst/>
           </a:prstGeom>
+          <a:noFill/>
         </p:spPr>
-      </p:pic>
+        <p:txBody>
+          <a:bodyPr wrap="none" rtlCol="0">
+            <a:spAutoFit/>
+          </a:bodyPr>
+          <a:lstStyle/>
+          <a:p>
+            <a:r>
+              <a:rPr lang="en-US" dirty="0"/>
+              <a:t>Finished. Questions?</a:t>
+            </a:r>
+          </a:p>
+        </p:txBody>
+      </p:sp>
     </p:spTree>
     <p:extLst>
       <p:ext uri="{BB962C8B-B14F-4D97-AF65-F5344CB8AC3E}">
-        <p14:creationId xmlns:p14="http://schemas.microsoft.com/office/powerpoint/2010/main" val="1831579724"/>
+        <p14:creationId xmlns:p14="http://schemas.microsoft.com/office/powerpoint/2010/main" val="633668904"/>
       </p:ext>
     </p:extLst>
   </p:cSld>
@@ -6158,7 +6156,7 @@
 </p:sld>
 </file>
 
-<file path=ppt/slides/slide11.xml><?xml version="1.0" encoding="utf-8"?>
+<file path=ppt/slides/slide2.xml><?xml version="1.0" encoding="utf-8"?>
 <p:sld xmlns:a="http://schemas.openxmlformats.org/drawingml/2006/main" xmlns:r="http://schemas.openxmlformats.org/officeDocument/2006/relationships" xmlns:p="http://schemas.openxmlformats.org/presentationml/2006/main">
   <p:cSld>
     <p:spTree>
@@ -6180,6 +6178,313 @@
           <p:cNvPr id="2" name="Title 1">
             <a:extLst>
               <a:ext uri="{FF2B5EF4-FFF2-40B4-BE49-F238E27FC236}">
+                <a16:creationId xmlns:a16="http://schemas.microsoft.com/office/drawing/2014/main" id="{5FFC5C04-82B7-4496-A7B6-6628DEA53298}"/>
+              </a:ext>
+            </a:extLst>
+          </p:cNvPr>
+          <p:cNvSpPr>
+            <a:spLocks noGrp="1"/>
+          </p:cNvSpPr>
+          <p:nvPr>
+            <p:ph type="title"/>
+          </p:nvPr>
+        </p:nvSpPr>
+        <p:spPr/>
+        <p:txBody>
+          <a:bodyPr/>
+          <a:lstStyle/>
+          <a:p>
+            <a:r>
+              <a:rPr lang="en-US" dirty="0"/>
+              <a:t>Goals of the project</a:t>
+            </a:r>
+          </a:p>
+        </p:txBody>
+      </p:sp>
+      <p:sp>
+        <p:nvSpPr>
+          <p:cNvPr id="3" name="Content Placeholder 2">
+            <a:extLst>
+              <a:ext uri="{FF2B5EF4-FFF2-40B4-BE49-F238E27FC236}">
+                <a16:creationId xmlns:a16="http://schemas.microsoft.com/office/drawing/2014/main" id="{91ADF8CA-681D-4145-8C11-A31AC8DB6DD7}"/>
+              </a:ext>
+            </a:extLst>
+          </p:cNvPr>
+          <p:cNvSpPr>
+            <a:spLocks noGrp="1"/>
+          </p:cNvSpPr>
+          <p:nvPr>
+            <p:ph idx="1"/>
+          </p:nvPr>
+        </p:nvSpPr>
+        <p:spPr/>
+        <p:txBody>
+          <a:bodyPr/>
+          <a:lstStyle/>
+          <a:p>
+            <a:r>
+              <a:rPr lang="en-US" dirty="0"/>
+              <a:t>Ability to scan barcodes of new inventory from a cellphone camera</a:t>
+            </a:r>
+          </a:p>
+          <a:p>
+            <a:r>
+              <a:rPr lang="en-US" dirty="0"/>
+              <a:t>Organize inventory information in a format that will allow for easy viewing, editing and auditing</a:t>
+            </a:r>
+          </a:p>
+          <a:p>
+            <a:r>
+              <a:rPr lang="en-US" dirty="0"/>
+              <a:t>Have an easy to use interface</a:t>
+            </a:r>
+          </a:p>
+          <a:p>
+            <a:r>
+              <a:rPr lang="en-US" dirty="0"/>
+              <a:t>Comprehensive documentation for future developers of the project</a:t>
+            </a:r>
+          </a:p>
+        </p:txBody>
+      </p:sp>
+    </p:spTree>
+    <p:extLst>
+      <p:ext uri="{BB962C8B-B14F-4D97-AF65-F5344CB8AC3E}">
+        <p14:creationId xmlns:p14="http://schemas.microsoft.com/office/powerpoint/2010/main" val="1416790384"/>
+      </p:ext>
+    </p:extLst>
+  </p:cSld>
+  <p:clrMapOvr>
+    <a:masterClrMapping/>
+  </p:clrMapOvr>
+</p:sld>
+</file>
+
+<file path=ppt/slides/slide3.xml><?xml version="1.0" encoding="utf-8"?>
+<p:sld xmlns:a="http://schemas.openxmlformats.org/drawingml/2006/main" xmlns:r="http://schemas.openxmlformats.org/officeDocument/2006/relationships" xmlns:p="http://schemas.openxmlformats.org/presentationml/2006/main">
+  <p:cSld>
+    <p:spTree>
+      <p:nvGrpSpPr>
+        <p:cNvPr id="1" name=""/>
+        <p:cNvGrpSpPr/>
+        <p:nvPr/>
+      </p:nvGrpSpPr>
+      <p:grpSpPr>
+        <a:xfrm>
+          <a:off x="0" y="0"/>
+          <a:ext cx="0" cy="0"/>
+          <a:chOff x="0" y="0"/>
+          <a:chExt cx="0" cy="0"/>
+        </a:xfrm>
+      </p:grpSpPr>
+      <p:sp>
+        <p:nvSpPr>
+          <p:cNvPr id="2" name="Title 1">
+            <a:extLst>
+              <a:ext uri="{FF2B5EF4-FFF2-40B4-BE49-F238E27FC236}">
+                <a16:creationId xmlns:a16="http://schemas.microsoft.com/office/drawing/2014/main" id="{3BEDCEEE-9AB9-476A-9C65-90E10C8BDA3E}"/>
+              </a:ext>
+            </a:extLst>
+          </p:cNvPr>
+          <p:cNvSpPr>
+            <a:spLocks noGrp="1"/>
+          </p:cNvSpPr>
+          <p:nvPr>
+            <p:ph type="title"/>
+          </p:nvPr>
+        </p:nvSpPr>
+        <p:spPr/>
+        <p:txBody>
+          <a:bodyPr/>
+          <a:lstStyle/>
+          <a:p>
+            <a:r>
+              <a:rPr lang="en-US" dirty="0"/>
+              <a:t>Interface</a:t>
+            </a:r>
+          </a:p>
+        </p:txBody>
+      </p:sp>
+      <p:sp>
+        <p:nvSpPr>
+          <p:cNvPr id="3" name="Text Placeholder 2">
+            <a:extLst>
+              <a:ext uri="{FF2B5EF4-FFF2-40B4-BE49-F238E27FC236}">
+                <a16:creationId xmlns:a16="http://schemas.microsoft.com/office/drawing/2014/main" id="{2D37D411-9A6D-4CE7-9E08-A00B920284AB}"/>
+              </a:ext>
+            </a:extLst>
+          </p:cNvPr>
+          <p:cNvSpPr>
+            <a:spLocks noGrp="1"/>
+          </p:cNvSpPr>
+          <p:nvPr>
+            <p:ph type="body" idx="1"/>
+          </p:nvPr>
+        </p:nvSpPr>
+        <p:spPr/>
+        <p:txBody>
+          <a:bodyPr/>
+          <a:lstStyle/>
+          <a:p>
+            <a:r>
+              <a:rPr lang="en-US" dirty="0"/>
+              <a:t>Goals</a:t>
+            </a:r>
+          </a:p>
+        </p:txBody>
+      </p:sp>
+      <p:sp>
+        <p:nvSpPr>
+          <p:cNvPr id="4" name="Content Placeholder 3">
+            <a:extLst>
+              <a:ext uri="{FF2B5EF4-FFF2-40B4-BE49-F238E27FC236}">
+                <a16:creationId xmlns:a16="http://schemas.microsoft.com/office/drawing/2014/main" id="{F07C75BC-32D2-471A-BC76-93F328DB3B7B}"/>
+              </a:ext>
+            </a:extLst>
+          </p:cNvPr>
+          <p:cNvSpPr>
+            <a:spLocks noGrp="1"/>
+          </p:cNvSpPr>
+          <p:nvPr>
+            <p:ph sz="half" idx="2"/>
+          </p:nvPr>
+        </p:nvSpPr>
+        <p:spPr/>
+        <p:txBody>
+          <a:bodyPr/>
+          <a:lstStyle/>
+          <a:p>
+            <a:r>
+              <a:rPr lang="en-US" dirty="0"/>
+              <a:t>Prioritizing Android compatibility using a web-based application. </a:t>
+            </a:r>
+          </a:p>
+          <a:p>
+            <a:r>
+              <a:rPr lang="en-US" dirty="0"/>
+              <a:t>Easy access to features (login, stored inventory, scanner features)</a:t>
+            </a:r>
+          </a:p>
+          <a:p>
+            <a:r>
+              <a:rPr lang="en-US" dirty="0"/>
+              <a:t>Compliant with university style guidelines </a:t>
+            </a:r>
+          </a:p>
+        </p:txBody>
+      </p:sp>
+      <p:sp>
+        <p:nvSpPr>
+          <p:cNvPr id="5" name="Text Placeholder 4">
+            <a:extLst>
+              <a:ext uri="{FF2B5EF4-FFF2-40B4-BE49-F238E27FC236}">
+                <a16:creationId xmlns:a16="http://schemas.microsoft.com/office/drawing/2014/main" id="{CAC99D2E-83CC-49F9-96FD-4742C4DD2559}"/>
+              </a:ext>
+            </a:extLst>
+          </p:cNvPr>
+          <p:cNvSpPr>
+            <a:spLocks noGrp="1"/>
+          </p:cNvSpPr>
+          <p:nvPr>
+            <p:ph type="body" sz="quarter" idx="3"/>
+          </p:nvPr>
+        </p:nvSpPr>
+        <p:spPr/>
+        <p:txBody>
+          <a:bodyPr/>
+          <a:lstStyle/>
+          <a:p>
+            <a:r>
+              <a:rPr lang="en-US" dirty="0"/>
+              <a:t>Final State</a:t>
+            </a:r>
+          </a:p>
+        </p:txBody>
+      </p:sp>
+      <p:sp>
+        <p:nvSpPr>
+          <p:cNvPr id="6" name="Content Placeholder 5">
+            <a:extLst>
+              <a:ext uri="{FF2B5EF4-FFF2-40B4-BE49-F238E27FC236}">
+                <a16:creationId xmlns:a16="http://schemas.microsoft.com/office/drawing/2014/main" id="{C4BCDA0F-0D7F-4DA7-A18B-97DE27E881C6}"/>
+              </a:ext>
+            </a:extLst>
+          </p:cNvPr>
+          <p:cNvSpPr>
+            <a:spLocks noGrp="1"/>
+          </p:cNvSpPr>
+          <p:nvPr>
+            <p:ph sz="quarter" idx="4"/>
+          </p:nvPr>
+        </p:nvSpPr>
+        <p:spPr/>
+        <p:txBody>
+          <a:bodyPr/>
+          <a:lstStyle/>
+          <a:p>
+            <a:r>
+              <a:rPr lang="en-US" dirty="0"/>
+              <a:t>We were not able to test on mobile</a:t>
+            </a:r>
+          </a:p>
+          <a:p>
+            <a:r>
+              <a:rPr lang="en-US" dirty="0"/>
+              <a:t>All features are accusable and are easily accessible from the home page </a:t>
+            </a:r>
+          </a:p>
+          <a:p>
+            <a:r>
+              <a:rPr lang="en-US" dirty="0"/>
+              <a:t>Interface complies with und style guidelines </a:t>
+            </a:r>
+          </a:p>
+          <a:p>
+            <a:endParaRPr lang="en-US" dirty="0"/>
+          </a:p>
+          <a:p>
+            <a:endParaRPr lang="en-US" dirty="0"/>
+          </a:p>
+          <a:p>
+            <a:endParaRPr lang="en-US" dirty="0"/>
+          </a:p>
+        </p:txBody>
+      </p:sp>
+    </p:spTree>
+    <p:extLst>
+      <p:ext uri="{BB962C8B-B14F-4D97-AF65-F5344CB8AC3E}">
+        <p14:creationId xmlns:p14="http://schemas.microsoft.com/office/powerpoint/2010/main" val="1068276390"/>
+      </p:ext>
+    </p:extLst>
+  </p:cSld>
+  <p:clrMapOvr>
+    <a:masterClrMapping/>
+  </p:clrMapOvr>
+</p:sld>
+</file>
+
+<file path=ppt/slides/slide4.xml><?xml version="1.0" encoding="utf-8"?>
+<p:sld xmlns:a="http://schemas.openxmlformats.org/drawingml/2006/main" xmlns:r="http://schemas.openxmlformats.org/officeDocument/2006/relationships" xmlns:p="http://schemas.openxmlformats.org/presentationml/2006/main">
+  <p:cSld>
+    <p:spTree>
+      <p:nvGrpSpPr>
+        <p:cNvPr id="1" name=""/>
+        <p:cNvGrpSpPr/>
+        <p:nvPr/>
+      </p:nvGrpSpPr>
+      <p:grpSpPr>
+        <a:xfrm>
+          <a:off x="0" y="0"/>
+          <a:ext cx="0" cy="0"/>
+          <a:chOff x="0" y="0"/>
+          <a:chExt cx="0" cy="0"/>
+        </a:xfrm>
+      </p:grpSpPr>
+      <p:sp>
+        <p:nvSpPr>
+          <p:cNvPr id="2" name="Title 1">
+            <a:extLst>
+              <a:ext uri="{FF2B5EF4-FFF2-40B4-BE49-F238E27FC236}">
                 <a16:creationId xmlns:a16="http://schemas.microsoft.com/office/drawing/2014/main" id="{F8E91008-10BF-44AE-A437-F19FDBEC3A23}"/>
               </a:ext>
             </a:extLst>
@@ -6331,13 +6636,8 @@
           <a:p>
             <a:r>
               <a:rPr lang="en-US" dirty="0"/>
-              <a:t>Website successfully connects to the server when hosted </a:t>
-            </a:r>
-            <a:r>
-              <a:rPr lang="en-US" dirty="0" err="1"/>
-              <a:t>localy</a:t>
-            </a:r>
-            <a:endParaRPr lang="en-US" dirty="0"/>
+              <a:t>Website successfully connects to the server when hosted locally, But is having trouble with editing </a:t>
+            </a:r>
           </a:p>
         </p:txBody>
       </p:sp>
@@ -6354,7 +6654,7 @@
 </p:sld>
 </file>
 
-<file path=ppt/slides/slide12.xml><?xml version="1.0" encoding="utf-8"?>
+<file path=ppt/slides/slide5.xml><?xml version="1.0" encoding="utf-8"?>
 <p:sld xmlns:a="http://schemas.openxmlformats.org/drawingml/2006/main" xmlns:r="http://schemas.openxmlformats.org/officeDocument/2006/relationships" xmlns:p="http://schemas.openxmlformats.org/presentationml/2006/main">
   <p:cSld>
     <p:spTree>
@@ -6466,7 +6766,7 @@
 </p:sld>
 </file>
 
-<file path=ppt/slides/slide13.xml><?xml version="1.0" encoding="utf-8"?>
+<file path=ppt/slides/slide6.xml><?xml version="1.0" encoding="utf-8"?>
 <p:sld xmlns:a="http://schemas.openxmlformats.org/drawingml/2006/main" xmlns:r="http://schemas.openxmlformats.org/officeDocument/2006/relationships" xmlns:p="http://schemas.openxmlformats.org/presentationml/2006/main">
   <p:cSld>
     <p:spTree>
@@ -6537,7 +6837,7 @@
 </p:sld>
 </file>
 
-<file path=ppt/slides/slide14.xml><?xml version="1.0" encoding="utf-8"?>
+<file path=ppt/slides/slide7.xml><?xml version="1.0" encoding="utf-8"?>
 <p:sld xmlns:a="http://schemas.openxmlformats.org/drawingml/2006/main" xmlns:r="http://schemas.openxmlformats.org/officeDocument/2006/relationships" xmlns:p="http://schemas.openxmlformats.org/presentationml/2006/main">
   <p:cSld>
     <p:spTree>
@@ -6608,906 +6908,6 @@
 </p:sld>
 </file>
 
-<file path=ppt/slides/slide15.xml><?xml version="1.0" encoding="utf-8"?>
-<p:sld xmlns:a="http://schemas.openxmlformats.org/drawingml/2006/main" xmlns:r="http://schemas.openxmlformats.org/officeDocument/2006/relationships" xmlns:p="http://schemas.openxmlformats.org/presentationml/2006/main">
-  <p:cSld>
-    <p:spTree>
-      <p:nvGrpSpPr>
-        <p:cNvPr id="1" name=""/>
-        <p:cNvGrpSpPr/>
-        <p:nvPr/>
-      </p:nvGrpSpPr>
-      <p:grpSpPr>
-        <a:xfrm>
-          <a:off x="0" y="0"/>
-          <a:ext cx="0" cy="0"/>
-          <a:chOff x="0" y="0"/>
-          <a:chExt cx="0" cy="0"/>
-        </a:xfrm>
-      </p:grpSpPr>
-      <p:sp>
-        <p:nvSpPr>
-          <p:cNvPr id="2" name="Title 1">
-            <a:extLst>
-              <a:ext uri="{FF2B5EF4-FFF2-40B4-BE49-F238E27FC236}">
-                <a16:creationId xmlns:a16="http://schemas.microsoft.com/office/drawing/2014/main" id="{F716DD9B-F7D2-4287-98AE-F7F86AE565D6}"/>
-              </a:ext>
-            </a:extLst>
-          </p:cNvPr>
-          <p:cNvSpPr>
-            <a:spLocks noGrp="1"/>
-          </p:cNvSpPr>
-          <p:nvPr>
-            <p:ph type="title"/>
-          </p:nvPr>
-        </p:nvSpPr>
-        <p:spPr/>
-        <p:txBody>
-          <a:bodyPr/>
-          <a:lstStyle/>
-          <a:p>
-            <a:r>
-              <a:rPr lang="en-US" dirty="0"/>
-              <a:t>Scanner </a:t>
-            </a:r>
-          </a:p>
-        </p:txBody>
-      </p:sp>
-      <p:sp>
-        <p:nvSpPr>
-          <p:cNvPr id="3" name="Text Placeholder 2">
-            <a:extLst>
-              <a:ext uri="{FF2B5EF4-FFF2-40B4-BE49-F238E27FC236}">
-                <a16:creationId xmlns:a16="http://schemas.microsoft.com/office/drawing/2014/main" id="{DC61E3B9-0220-4689-B1A3-FBD7648DF8BE}"/>
-              </a:ext>
-            </a:extLst>
-          </p:cNvPr>
-          <p:cNvSpPr>
-            <a:spLocks noGrp="1"/>
-          </p:cNvSpPr>
-          <p:nvPr>
-            <p:ph type="body" idx="1"/>
-          </p:nvPr>
-        </p:nvSpPr>
-        <p:spPr/>
-        <p:txBody>
-          <a:bodyPr/>
-          <a:lstStyle/>
-          <a:p>
-            <a:r>
-              <a:rPr lang="en-US" dirty="0"/>
-              <a:t>Goals</a:t>
-            </a:r>
-          </a:p>
-        </p:txBody>
-      </p:sp>
-      <p:sp>
-        <p:nvSpPr>
-          <p:cNvPr id="4" name="Content Placeholder 3">
-            <a:extLst>
-              <a:ext uri="{FF2B5EF4-FFF2-40B4-BE49-F238E27FC236}">
-                <a16:creationId xmlns:a16="http://schemas.microsoft.com/office/drawing/2014/main" id="{113B233D-CB85-4464-8C8E-378BF3781D3C}"/>
-              </a:ext>
-            </a:extLst>
-          </p:cNvPr>
-          <p:cNvSpPr>
-            <a:spLocks noGrp="1"/>
-          </p:cNvSpPr>
-          <p:nvPr>
-            <p:ph sz="half" idx="2"/>
-          </p:nvPr>
-        </p:nvSpPr>
-        <p:spPr/>
-        <p:txBody>
-          <a:bodyPr/>
-          <a:lstStyle/>
-          <a:p>
-            <a:r>
-              <a:rPr lang="en-US" dirty="0"/>
-              <a:t>Scanning the barcodes found on department inventory from a phone camera </a:t>
-            </a:r>
-          </a:p>
-          <a:p>
-            <a:r>
-              <a:rPr lang="en-US" dirty="0"/>
-              <a:t>Secondary goal: scanning barcodes from a PC</a:t>
-            </a:r>
-          </a:p>
-        </p:txBody>
-      </p:sp>
-      <p:sp>
-        <p:nvSpPr>
-          <p:cNvPr id="5" name="Text Placeholder 4">
-            <a:extLst>
-              <a:ext uri="{FF2B5EF4-FFF2-40B4-BE49-F238E27FC236}">
-                <a16:creationId xmlns:a16="http://schemas.microsoft.com/office/drawing/2014/main" id="{62BF2970-E608-4186-97CC-9D9ED5F69208}"/>
-              </a:ext>
-            </a:extLst>
-          </p:cNvPr>
-          <p:cNvSpPr>
-            <a:spLocks noGrp="1"/>
-          </p:cNvSpPr>
-          <p:nvPr>
-            <p:ph type="body" sz="quarter" idx="3"/>
-          </p:nvPr>
-        </p:nvSpPr>
-        <p:spPr/>
-        <p:txBody>
-          <a:bodyPr/>
-          <a:lstStyle/>
-          <a:p>
-            <a:r>
-              <a:rPr lang="en-US" dirty="0"/>
-              <a:t>Final State</a:t>
-            </a:r>
-          </a:p>
-        </p:txBody>
-      </p:sp>
-      <p:sp>
-        <p:nvSpPr>
-          <p:cNvPr id="6" name="Content Placeholder 5">
-            <a:extLst>
-              <a:ext uri="{FF2B5EF4-FFF2-40B4-BE49-F238E27FC236}">
-                <a16:creationId xmlns:a16="http://schemas.microsoft.com/office/drawing/2014/main" id="{7B0DA6A4-7943-48B5-8D83-2D2FB062D6E9}"/>
-              </a:ext>
-            </a:extLst>
-          </p:cNvPr>
-          <p:cNvSpPr>
-            <a:spLocks noGrp="1"/>
-          </p:cNvSpPr>
-          <p:nvPr>
-            <p:ph sz="quarter" idx="4"/>
-          </p:nvPr>
-        </p:nvSpPr>
-        <p:spPr/>
-        <p:txBody>
-          <a:bodyPr/>
-          <a:lstStyle/>
-          <a:p>
-            <a:r>
-              <a:rPr lang="en-US" dirty="0"/>
-              <a:t>On android scanning is handled by a call to the external app “Barcode Scanner”</a:t>
-            </a:r>
-          </a:p>
-          <a:p>
-            <a:r>
-              <a:rPr lang="en-US" dirty="0"/>
-              <a:t>On PC scanning is handled by a USB hand scanner </a:t>
-            </a:r>
-          </a:p>
-          <a:p>
-            <a:r>
-              <a:rPr lang="en-US" dirty="0"/>
-              <a:t>No scanning available on non android phones</a:t>
-            </a:r>
-          </a:p>
-        </p:txBody>
-      </p:sp>
-    </p:spTree>
-    <p:extLst>
-      <p:ext uri="{BB962C8B-B14F-4D97-AF65-F5344CB8AC3E}">
-        <p14:creationId xmlns:p14="http://schemas.microsoft.com/office/powerpoint/2010/main" val="4020540796"/>
-      </p:ext>
-    </p:extLst>
-  </p:cSld>
-  <p:clrMapOvr>
-    <a:masterClrMapping/>
-  </p:clrMapOvr>
-</p:sld>
-</file>
-
-<file path=ppt/slides/slide16.xml><?xml version="1.0" encoding="utf-8"?>
-<p:sld xmlns:a="http://schemas.openxmlformats.org/drawingml/2006/main" xmlns:r="http://schemas.openxmlformats.org/officeDocument/2006/relationships" xmlns:p="http://schemas.openxmlformats.org/presentationml/2006/main">
-  <p:cSld>
-    <p:spTree>
-      <p:nvGrpSpPr>
-        <p:cNvPr id="1" name=""/>
-        <p:cNvGrpSpPr/>
-        <p:nvPr/>
-      </p:nvGrpSpPr>
-      <p:grpSpPr>
-        <a:xfrm>
-          <a:off x="0" y="0"/>
-          <a:ext cx="0" cy="0"/>
-          <a:chOff x="0" y="0"/>
-          <a:chExt cx="0" cy="0"/>
-        </a:xfrm>
-      </p:grpSpPr>
-      <p:sp>
-        <p:nvSpPr>
-          <p:cNvPr id="2" name="Title 1"/>
-          <p:cNvSpPr>
-            <a:spLocks noGrp="1"/>
-          </p:cNvSpPr>
-          <p:nvPr>
-            <p:ph type="title"/>
-          </p:nvPr>
-        </p:nvSpPr>
-        <p:spPr/>
-        <p:txBody>
-          <a:bodyPr/>
-          <a:lstStyle/>
-          <a:p>
-            <a:r>
-              <a:rPr lang="en-US" dirty="0"/>
-              <a:t>Possible future work</a:t>
-            </a:r>
-          </a:p>
-        </p:txBody>
-      </p:sp>
-      <p:sp>
-        <p:nvSpPr>
-          <p:cNvPr id="3" name="Content Placeholder 2"/>
-          <p:cNvSpPr>
-            <a:spLocks noGrp="1"/>
-          </p:cNvSpPr>
-          <p:nvPr>
-            <p:ph idx="1"/>
-          </p:nvPr>
-        </p:nvSpPr>
-        <p:spPr/>
-        <p:txBody>
-          <a:bodyPr/>
-          <a:lstStyle/>
-          <a:p>
-            <a:r>
-              <a:rPr lang="en-US" dirty="0"/>
-              <a:t>Setting up a hosting server </a:t>
-            </a:r>
-          </a:p>
-          <a:p>
-            <a:r>
-              <a:rPr lang="en-US" dirty="0"/>
-              <a:t>Further optimizing the interface for mobile </a:t>
-            </a:r>
-          </a:p>
-          <a:p>
-            <a:r>
-              <a:rPr lang="en-US" dirty="0"/>
-              <a:t>Converting the data from the old system to this one</a:t>
-            </a:r>
-          </a:p>
-          <a:p>
-            <a:r>
-              <a:rPr lang="en-US" dirty="0"/>
-              <a:t>Adding a scanning option for IOS</a:t>
-            </a:r>
-          </a:p>
-          <a:p>
-            <a:pPr marL="0" indent="0">
-              <a:buNone/>
-            </a:pPr>
-            <a:endParaRPr lang="en-US" dirty="0"/>
-          </a:p>
-          <a:p>
-            <a:endParaRPr lang="en-US" dirty="0"/>
-          </a:p>
-        </p:txBody>
-      </p:sp>
-    </p:spTree>
-    <p:extLst>
-      <p:ext uri="{BB962C8B-B14F-4D97-AF65-F5344CB8AC3E}">
-        <p14:creationId xmlns:p14="http://schemas.microsoft.com/office/powerpoint/2010/main" val="1381390963"/>
-      </p:ext>
-    </p:extLst>
-  </p:cSld>
-  <p:clrMapOvr>
-    <a:masterClrMapping/>
-  </p:clrMapOvr>
-</p:sld>
-</file>
-
-<file path=ppt/slides/slide17.xml><?xml version="1.0" encoding="utf-8"?>
-<p:sld xmlns:a="http://schemas.openxmlformats.org/drawingml/2006/main" xmlns:r="http://schemas.openxmlformats.org/officeDocument/2006/relationships" xmlns:p="http://schemas.openxmlformats.org/presentationml/2006/main">
-  <p:cSld>
-    <p:spTree>
-      <p:nvGrpSpPr>
-        <p:cNvPr id="1" name=""/>
-        <p:cNvGrpSpPr/>
-        <p:nvPr/>
-      </p:nvGrpSpPr>
-      <p:grpSpPr>
-        <a:xfrm>
-          <a:off x="0" y="0"/>
-          <a:ext cx="0" cy="0"/>
-          <a:chOff x="0" y="0"/>
-          <a:chExt cx="0" cy="0"/>
-        </a:xfrm>
-      </p:grpSpPr>
-      <p:sp>
-        <p:nvSpPr>
-          <p:cNvPr id="2" name="TextBox 1">
-            <a:extLst>
-              <a:ext uri="{FF2B5EF4-FFF2-40B4-BE49-F238E27FC236}">
-                <a16:creationId xmlns:a16="http://schemas.microsoft.com/office/drawing/2014/main" id="{EAB9DF37-18D9-437E-96E1-BB97F36140D0}"/>
-              </a:ext>
-            </a:extLst>
-          </p:cNvPr>
-          <p:cNvSpPr txBox="1"/>
-          <p:nvPr/>
-        </p:nvSpPr>
-        <p:spPr>
-          <a:xfrm>
-            <a:off x="4883969" y="3244334"/>
-            <a:ext cx="2424062" cy="369332"/>
-          </a:xfrm>
-          <a:prstGeom prst="rect">
-            <a:avLst/>
-          </a:prstGeom>
-          <a:noFill/>
-        </p:spPr>
-        <p:txBody>
-          <a:bodyPr wrap="none" rtlCol="0">
-            <a:spAutoFit/>
-          </a:bodyPr>
-          <a:lstStyle/>
-          <a:p>
-            <a:r>
-              <a:rPr lang="en-US" dirty="0"/>
-              <a:t>Finished. Questions?</a:t>
-            </a:r>
-          </a:p>
-        </p:txBody>
-      </p:sp>
-    </p:spTree>
-    <p:extLst>
-      <p:ext uri="{BB962C8B-B14F-4D97-AF65-F5344CB8AC3E}">
-        <p14:creationId xmlns:p14="http://schemas.microsoft.com/office/powerpoint/2010/main" val="633668904"/>
-      </p:ext>
-    </p:extLst>
-  </p:cSld>
-  <p:clrMapOvr>
-    <a:masterClrMapping/>
-  </p:clrMapOvr>
-</p:sld>
-</file>
-
-<file path=ppt/slides/slide2.xml><?xml version="1.0" encoding="utf-8"?>
-<p:sld xmlns:a="http://schemas.openxmlformats.org/drawingml/2006/main" xmlns:r="http://schemas.openxmlformats.org/officeDocument/2006/relationships" xmlns:p="http://schemas.openxmlformats.org/presentationml/2006/main">
-  <p:cSld>
-    <p:spTree>
-      <p:nvGrpSpPr>
-        <p:cNvPr id="1" name=""/>
-        <p:cNvGrpSpPr/>
-        <p:nvPr/>
-      </p:nvGrpSpPr>
-      <p:grpSpPr>
-        <a:xfrm>
-          <a:off x="0" y="0"/>
-          <a:ext cx="0" cy="0"/>
-          <a:chOff x="0" y="0"/>
-          <a:chExt cx="0" cy="0"/>
-        </a:xfrm>
-      </p:grpSpPr>
-      <p:sp>
-        <p:nvSpPr>
-          <p:cNvPr id="2" name="Title 1">
-            <a:extLst>
-              <a:ext uri="{FF2B5EF4-FFF2-40B4-BE49-F238E27FC236}">
-                <a16:creationId xmlns:a16="http://schemas.microsoft.com/office/drawing/2014/main" id="{5FFC5C04-82B7-4496-A7B6-6628DEA53298}"/>
-              </a:ext>
-            </a:extLst>
-          </p:cNvPr>
-          <p:cNvSpPr>
-            <a:spLocks noGrp="1"/>
-          </p:cNvSpPr>
-          <p:nvPr>
-            <p:ph type="title"/>
-          </p:nvPr>
-        </p:nvSpPr>
-        <p:spPr/>
-        <p:txBody>
-          <a:bodyPr/>
-          <a:lstStyle/>
-          <a:p>
-            <a:r>
-              <a:rPr lang="en-US" dirty="0"/>
-              <a:t>Goals of the project</a:t>
-            </a:r>
-          </a:p>
-        </p:txBody>
-      </p:sp>
-      <p:sp>
-        <p:nvSpPr>
-          <p:cNvPr id="3" name="Content Placeholder 2">
-            <a:extLst>
-              <a:ext uri="{FF2B5EF4-FFF2-40B4-BE49-F238E27FC236}">
-                <a16:creationId xmlns:a16="http://schemas.microsoft.com/office/drawing/2014/main" id="{91ADF8CA-681D-4145-8C11-A31AC8DB6DD7}"/>
-              </a:ext>
-            </a:extLst>
-          </p:cNvPr>
-          <p:cNvSpPr>
-            <a:spLocks noGrp="1"/>
-          </p:cNvSpPr>
-          <p:nvPr>
-            <p:ph idx="1"/>
-          </p:nvPr>
-        </p:nvSpPr>
-        <p:spPr/>
-        <p:txBody>
-          <a:bodyPr/>
-          <a:lstStyle/>
-          <a:p>
-            <a:r>
-              <a:rPr lang="en-US" dirty="0"/>
-              <a:t>Ability to scan barcodes of new inventory from a cellphone camera</a:t>
-            </a:r>
-          </a:p>
-          <a:p>
-            <a:r>
-              <a:rPr lang="en-US" dirty="0"/>
-              <a:t>Organize inventory information in a format that will allow for easy viewing, editing and auditing</a:t>
-            </a:r>
-          </a:p>
-          <a:p>
-            <a:r>
-              <a:rPr lang="en-US" dirty="0"/>
-              <a:t>Have an easy to use interface</a:t>
-            </a:r>
-          </a:p>
-          <a:p>
-            <a:r>
-              <a:rPr lang="en-US" dirty="0"/>
-              <a:t>Comprehensive documentation for future developers of the project</a:t>
-            </a:r>
-          </a:p>
-        </p:txBody>
-      </p:sp>
-    </p:spTree>
-    <p:extLst>
-      <p:ext uri="{BB962C8B-B14F-4D97-AF65-F5344CB8AC3E}">
-        <p14:creationId xmlns:p14="http://schemas.microsoft.com/office/powerpoint/2010/main" val="1416790384"/>
-      </p:ext>
-    </p:extLst>
-  </p:cSld>
-  <p:clrMapOvr>
-    <a:masterClrMapping/>
-  </p:clrMapOvr>
-</p:sld>
-</file>
-
-<file path=ppt/slides/slide3.xml><?xml version="1.0" encoding="utf-8"?>
-<p:sld xmlns:a="http://schemas.openxmlformats.org/drawingml/2006/main" xmlns:r="http://schemas.openxmlformats.org/officeDocument/2006/relationships" xmlns:p="http://schemas.openxmlformats.org/presentationml/2006/main">
-  <p:cSld>
-    <p:spTree>
-      <p:nvGrpSpPr>
-        <p:cNvPr id="1" name=""/>
-        <p:cNvGrpSpPr/>
-        <p:nvPr/>
-      </p:nvGrpSpPr>
-      <p:grpSpPr>
-        <a:xfrm>
-          <a:off x="0" y="0"/>
-          <a:ext cx="0" cy="0"/>
-          <a:chOff x="0" y="0"/>
-          <a:chExt cx="0" cy="0"/>
-        </a:xfrm>
-      </p:grpSpPr>
-      <p:sp>
-        <p:nvSpPr>
-          <p:cNvPr id="2" name="Title 1">
-            <a:extLst>
-              <a:ext uri="{FF2B5EF4-FFF2-40B4-BE49-F238E27FC236}">
-                <a16:creationId xmlns:a16="http://schemas.microsoft.com/office/drawing/2014/main" id="{3BEDCEEE-9AB9-476A-9C65-90E10C8BDA3E}"/>
-              </a:ext>
-            </a:extLst>
-          </p:cNvPr>
-          <p:cNvSpPr>
-            <a:spLocks noGrp="1"/>
-          </p:cNvSpPr>
-          <p:nvPr>
-            <p:ph type="title"/>
-          </p:nvPr>
-        </p:nvSpPr>
-        <p:spPr/>
-        <p:txBody>
-          <a:bodyPr/>
-          <a:lstStyle/>
-          <a:p>
-            <a:r>
-              <a:rPr lang="en-US" dirty="0"/>
-              <a:t>Interface</a:t>
-            </a:r>
-          </a:p>
-        </p:txBody>
-      </p:sp>
-      <p:sp>
-        <p:nvSpPr>
-          <p:cNvPr id="3" name="Text Placeholder 2">
-            <a:extLst>
-              <a:ext uri="{FF2B5EF4-FFF2-40B4-BE49-F238E27FC236}">
-                <a16:creationId xmlns:a16="http://schemas.microsoft.com/office/drawing/2014/main" id="{2D37D411-9A6D-4CE7-9E08-A00B920284AB}"/>
-              </a:ext>
-            </a:extLst>
-          </p:cNvPr>
-          <p:cNvSpPr>
-            <a:spLocks noGrp="1"/>
-          </p:cNvSpPr>
-          <p:nvPr>
-            <p:ph type="body" idx="1"/>
-          </p:nvPr>
-        </p:nvSpPr>
-        <p:spPr/>
-        <p:txBody>
-          <a:bodyPr/>
-          <a:lstStyle/>
-          <a:p>
-            <a:r>
-              <a:rPr lang="en-US" dirty="0"/>
-              <a:t>Goals</a:t>
-            </a:r>
-          </a:p>
-        </p:txBody>
-      </p:sp>
-      <p:sp>
-        <p:nvSpPr>
-          <p:cNvPr id="4" name="Content Placeholder 3">
-            <a:extLst>
-              <a:ext uri="{FF2B5EF4-FFF2-40B4-BE49-F238E27FC236}">
-                <a16:creationId xmlns:a16="http://schemas.microsoft.com/office/drawing/2014/main" id="{F07C75BC-32D2-471A-BC76-93F328DB3B7B}"/>
-              </a:ext>
-            </a:extLst>
-          </p:cNvPr>
-          <p:cNvSpPr>
-            <a:spLocks noGrp="1"/>
-          </p:cNvSpPr>
-          <p:nvPr>
-            <p:ph sz="half" idx="2"/>
-          </p:nvPr>
-        </p:nvSpPr>
-        <p:spPr/>
-        <p:txBody>
-          <a:bodyPr/>
-          <a:lstStyle/>
-          <a:p>
-            <a:r>
-              <a:rPr lang="en-US" dirty="0"/>
-              <a:t>Prioritizing Android compatibility using a web-based application. </a:t>
-            </a:r>
-          </a:p>
-          <a:p>
-            <a:r>
-              <a:rPr lang="en-US" dirty="0"/>
-              <a:t>Easy access to features (login, stored inventory, scanner features)</a:t>
-            </a:r>
-          </a:p>
-          <a:p>
-            <a:r>
-              <a:rPr lang="en-US" dirty="0"/>
-              <a:t>Compliant with university style guidelines </a:t>
-            </a:r>
-          </a:p>
-        </p:txBody>
-      </p:sp>
-      <p:sp>
-        <p:nvSpPr>
-          <p:cNvPr id="5" name="Text Placeholder 4">
-            <a:extLst>
-              <a:ext uri="{FF2B5EF4-FFF2-40B4-BE49-F238E27FC236}">
-                <a16:creationId xmlns:a16="http://schemas.microsoft.com/office/drawing/2014/main" id="{CAC99D2E-83CC-49F9-96FD-4742C4DD2559}"/>
-              </a:ext>
-            </a:extLst>
-          </p:cNvPr>
-          <p:cNvSpPr>
-            <a:spLocks noGrp="1"/>
-          </p:cNvSpPr>
-          <p:nvPr>
-            <p:ph type="body" sz="quarter" idx="3"/>
-          </p:nvPr>
-        </p:nvSpPr>
-        <p:spPr/>
-        <p:txBody>
-          <a:bodyPr/>
-          <a:lstStyle/>
-          <a:p>
-            <a:r>
-              <a:rPr lang="en-US" dirty="0"/>
-              <a:t>Final State</a:t>
-            </a:r>
-          </a:p>
-        </p:txBody>
-      </p:sp>
-      <p:sp>
-        <p:nvSpPr>
-          <p:cNvPr id="6" name="Content Placeholder 5">
-            <a:extLst>
-              <a:ext uri="{FF2B5EF4-FFF2-40B4-BE49-F238E27FC236}">
-                <a16:creationId xmlns:a16="http://schemas.microsoft.com/office/drawing/2014/main" id="{C4BCDA0F-0D7F-4DA7-A18B-97DE27E881C6}"/>
-              </a:ext>
-            </a:extLst>
-          </p:cNvPr>
-          <p:cNvSpPr>
-            <a:spLocks noGrp="1"/>
-          </p:cNvSpPr>
-          <p:nvPr>
-            <p:ph sz="quarter" idx="4"/>
-          </p:nvPr>
-        </p:nvSpPr>
-        <p:spPr/>
-        <p:txBody>
-          <a:bodyPr/>
-          <a:lstStyle/>
-          <a:p>
-            <a:r>
-              <a:rPr lang="en-US" dirty="0"/>
-              <a:t>We were not able to test on mobile</a:t>
-            </a:r>
-          </a:p>
-          <a:p>
-            <a:r>
-              <a:rPr lang="en-US" dirty="0"/>
-              <a:t>All features are accusable and are easily accessible from the home page </a:t>
-            </a:r>
-          </a:p>
-          <a:p>
-            <a:r>
-              <a:rPr lang="en-US" dirty="0"/>
-              <a:t>Interface complies with und style guidelines </a:t>
-            </a:r>
-          </a:p>
-          <a:p>
-            <a:endParaRPr lang="en-US" dirty="0"/>
-          </a:p>
-          <a:p>
-            <a:endParaRPr lang="en-US" dirty="0"/>
-          </a:p>
-          <a:p>
-            <a:endParaRPr lang="en-US" dirty="0"/>
-          </a:p>
-        </p:txBody>
-      </p:sp>
-    </p:spTree>
-    <p:extLst>
-      <p:ext uri="{BB962C8B-B14F-4D97-AF65-F5344CB8AC3E}">
-        <p14:creationId xmlns:p14="http://schemas.microsoft.com/office/powerpoint/2010/main" val="1068276390"/>
-      </p:ext>
-    </p:extLst>
-  </p:cSld>
-  <p:clrMapOvr>
-    <a:masterClrMapping/>
-  </p:clrMapOvr>
-</p:sld>
-</file>
-
-<file path=ppt/slides/slide4.xml><?xml version="1.0" encoding="utf-8"?>
-<p:sld xmlns:a="http://schemas.openxmlformats.org/drawingml/2006/main" xmlns:r="http://schemas.openxmlformats.org/officeDocument/2006/relationships" xmlns:p="http://schemas.openxmlformats.org/presentationml/2006/main">
-  <p:cSld>
-    <p:spTree>
-      <p:nvGrpSpPr>
-        <p:cNvPr id="1" name=""/>
-        <p:cNvGrpSpPr/>
-        <p:nvPr/>
-      </p:nvGrpSpPr>
-      <p:grpSpPr>
-        <a:xfrm>
-          <a:off x="0" y="0"/>
-          <a:ext cx="0" cy="0"/>
-          <a:chOff x="0" y="0"/>
-          <a:chExt cx="0" cy="0"/>
-        </a:xfrm>
-      </p:grpSpPr>
-      <p:pic>
-        <p:nvPicPr>
-          <p:cNvPr id="8" name="Content Placeholder 7">
-            <a:extLst>
-              <a:ext uri="{FF2B5EF4-FFF2-40B4-BE49-F238E27FC236}">
-                <a16:creationId xmlns:a16="http://schemas.microsoft.com/office/drawing/2014/main" id="{9808B6F8-4D39-439F-AEB4-03CAB65228A7}"/>
-              </a:ext>
-            </a:extLst>
-          </p:cNvPr>
-          <p:cNvPicPr>
-            <a:picLocks noGrp="1" noChangeAspect="1"/>
-          </p:cNvPicPr>
-          <p:nvPr>
-            <p:ph sz="half" idx="4294967295"/>
-          </p:nvPr>
-        </p:nvPicPr>
-        <p:blipFill>
-          <a:blip r:embed="rId2"/>
-          <a:stretch>
-            <a:fillRect/>
-          </a:stretch>
-        </p:blipFill>
-        <p:spPr>
-          <a:xfrm>
-            <a:off x="1615893" y="1453413"/>
-            <a:ext cx="8960214" cy="3951174"/>
-          </a:xfrm>
-        </p:spPr>
-      </p:pic>
-    </p:spTree>
-    <p:extLst>
-      <p:ext uri="{BB962C8B-B14F-4D97-AF65-F5344CB8AC3E}">
-        <p14:creationId xmlns:p14="http://schemas.microsoft.com/office/powerpoint/2010/main" val="3922303416"/>
-      </p:ext>
-    </p:extLst>
-  </p:cSld>
-  <p:clrMapOvr>
-    <a:masterClrMapping/>
-  </p:clrMapOvr>
-</p:sld>
-</file>
-
-<file path=ppt/slides/slide5.xml><?xml version="1.0" encoding="utf-8"?>
-<p:sld xmlns:a="http://schemas.openxmlformats.org/drawingml/2006/main" xmlns:r="http://schemas.openxmlformats.org/officeDocument/2006/relationships" xmlns:p="http://schemas.openxmlformats.org/presentationml/2006/main">
-  <p:cSld>
-    <p:spTree>
-      <p:nvGrpSpPr>
-        <p:cNvPr id="1" name=""/>
-        <p:cNvGrpSpPr/>
-        <p:nvPr/>
-      </p:nvGrpSpPr>
-      <p:grpSpPr>
-        <a:xfrm>
-          <a:off x="0" y="0"/>
-          <a:ext cx="0" cy="0"/>
-          <a:chOff x="0" y="0"/>
-          <a:chExt cx="0" cy="0"/>
-        </a:xfrm>
-      </p:grpSpPr>
-      <p:pic>
-        <p:nvPicPr>
-          <p:cNvPr id="3" name="Picture 2">
-            <a:extLst>
-              <a:ext uri="{FF2B5EF4-FFF2-40B4-BE49-F238E27FC236}">
-                <a16:creationId xmlns:a16="http://schemas.microsoft.com/office/drawing/2014/main" id="{3E8502E8-8EBC-4703-A6E2-EA5A3BD37F0E}"/>
-              </a:ext>
-            </a:extLst>
-          </p:cNvPr>
-          <p:cNvPicPr>
-            <a:picLocks noChangeAspect="1"/>
-          </p:cNvPicPr>
-          <p:nvPr/>
-        </p:nvPicPr>
-        <p:blipFill>
-          <a:blip r:embed="rId2"/>
-          <a:stretch>
-            <a:fillRect/>
-          </a:stretch>
-        </p:blipFill>
-        <p:spPr>
-          <a:xfrm>
-            <a:off x="1423335" y="1466576"/>
-            <a:ext cx="9345329" cy="3924848"/>
-          </a:xfrm>
-          <a:prstGeom prst="rect">
-            <a:avLst/>
-          </a:prstGeom>
-        </p:spPr>
-      </p:pic>
-    </p:spTree>
-    <p:extLst>
-      <p:ext uri="{BB962C8B-B14F-4D97-AF65-F5344CB8AC3E}">
-        <p14:creationId xmlns:p14="http://schemas.microsoft.com/office/powerpoint/2010/main" val="756737533"/>
-      </p:ext>
-    </p:extLst>
-  </p:cSld>
-  <p:clrMapOvr>
-    <a:masterClrMapping/>
-  </p:clrMapOvr>
-</p:sld>
-</file>
-
-<file path=ppt/slides/slide6.xml><?xml version="1.0" encoding="utf-8"?>
-<p:sld xmlns:a="http://schemas.openxmlformats.org/drawingml/2006/main" xmlns:r="http://schemas.openxmlformats.org/officeDocument/2006/relationships" xmlns:p="http://schemas.openxmlformats.org/presentationml/2006/main">
-  <p:cSld>
-    <p:spTree>
-      <p:nvGrpSpPr>
-        <p:cNvPr id="1" name=""/>
-        <p:cNvGrpSpPr/>
-        <p:nvPr/>
-      </p:nvGrpSpPr>
-      <p:grpSpPr>
-        <a:xfrm>
-          <a:off x="0" y="0"/>
-          <a:ext cx="0" cy="0"/>
-          <a:chOff x="0" y="0"/>
-          <a:chExt cx="0" cy="0"/>
-        </a:xfrm>
-      </p:grpSpPr>
-      <p:pic>
-        <p:nvPicPr>
-          <p:cNvPr id="3" name="Picture 2">
-            <a:extLst>
-              <a:ext uri="{FF2B5EF4-FFF2-40B4-BE49-F238E27FC236}">
-                <a16:creationId xmlns:a16="http://schemas.microsoft.com/office/drawing/2014/main" id="{6F562C10-67F3-4336-ACAD-3CCE38987EFB}"/>
-              </a:ext>
-            </a:extLst>
-          </p:cNvPr>
-          <p:cNvPicPr>
-            <a:picLocks noChangeAspect="1"/>
-          </p:cNvPicPr>
-          <p:nvPr/>
-        </p:nvPicPr>
-        <p:blipFill>
-          <a:blip r:embed="rId2"/>
-          <a:stretch>
-            <a:fillRect/>
-          </a:stretch>
-        </p:blipFill>
-        <p:spPr>
-          <a:xfrm>
-            <a:off x="2805438" y="0"/>
-            <a:ext cx="6581124" cy="6858000"/>
-          </a:xfrm>
-          <a:prstGeom prst="rect">
-            <a:avLst/>
-          </a:prstGeom>
-        </p:spPr>
-      </p:pic>
-    </p:spTree>
-    <p:extLst>
-      <p:ext uri="{BB962C8B-B14F-4D97-AF65-F5344CB8AC3E}">
-        <p14:creationId xmlns:p14="http://schemas.microsoft.com/office/powerpoint/2010/main" val="1827242836"/>
-      </p:ext>
-    </p:extLst>
-  </p:cSld>
-  <p:clrMapOvr>
-    <a:masterClrMapping/>
-  </p:clrMapOvr>
-</p:sld>
-</file>
-
-<file path=ppt/slides/slide7.xml><?xml version="1.0" encoding="utf-8"?>
-<p:sld xmlns:a="http://schemas.openxmlformats.org/drawingml/2006/main" xmlns:r="http://schemas.openxmlformats.org/officeDocument/2006/relationships" xmlns:p="http://schemas.openxmlformats.org/presentationml/2006/main">
-  <p:cSld>
-    <p:spTree>
-      <p:nvGrpSpPr>
-        <p:cNvPr id="1" name=""/>
-        <p:cNvGrpSpPr/>
-        <p:nvPr/>
-      </p:nvGrpSpPr>
-      <p:grpSpPr>
-        <a:xfrm>
-          <a:off x="0" y="0"/>
-          <a:ext cx="0" cy="0"/>
-          <a:chOff x="0" y="0"/>
-          <a:chExt cx="0" cy="0"/>
-        </a:xfrm>
-      </p:grpSpPr>
-      <p:pic>
-        <p:nvPicPr>
-          <p:cNvPr id="3" name="Picture 2" descr="A screenshot of a cell phone&#10;&#10;Description generated with very high confidence">
-            <a:extLst>
-              <a:ext uri="{FF2B5EF4-FFF2-40B4-BE49-F238E27FC236}">
-                <a16:creationId xmlns:a16="http://schemas.microsoft.com/office/drawing/2014/main" id="{20DE1A84-34C3-4E92-B3B6-46A83577031F}"/>
-              </a:ext>
-            </a:extLst>
-          </p:cNvPr>
-          <p:cNvPicPr>
-            <a:picLocks noChangeAspect="1"/>
-          </p:cNvPicPr>
-          <p:nvPr/>
-        </p:nvPicPr>
-        <p:blipFill>
-          <a:blip r:embed="rId2"/>
-          <a:stretch>
-            <a:fillRect/>
-          </a:stretch>
-        </p:blipFill>
-        <p:spPr>
-          <a:xfrm>
-            <a:off x="1492445" y="1014285"/>
-            <a:ext cx="9207109" cy="4829430"/>
-          </a:xfrm>
-          <a:prstGeom prst="rect">
-            <a:avLst/>
-          </a:prstGeom>
-        </p:spPr>
-      </p:pic>
-    </p:spTree>
-    <p:extLst>
-      <p:ext uri="{BB962C8B-B14F-4D97-AF65-F5344CB8AC3E}">
-        <p14:creationId xmlns:p14="http://schemas.microsoft.com/office/powerpoint/2010/main" val="3910984158"/>
-      </p:ext>
-    </p:extLst>
-  </p:cSld>
-  <p:clrMapOvr>
-    <a:masterClrMapping/>
-  </p:clrMapOvr>
-</p:sld>
-</file>
-
 <file path=ppt/slides/slide8.xml><?xml version="1.0" encoding="utf-8"?>
 <p:sld xmlns:a="http://schemas.openxmlformats.org/drawingml/2006/main" xmlns:r="http://schemas.openxmlformats.org/officeDocument/2006/relationships" xmlns:p="http://schemas.openxmlformats.org/presentationml/2006/main">
   <p:cSld>
@@ -7525,40 +6925,168 @@
           <a:chExt cx="0" cy="0"/>
         </a:xfrm>
       </p:grpSpPr>
-      <p:pic>
-        <p:nvPicPr>
-          <p:cNvPr id="3" name="Picture 2" descr="A screenshot of a cell phone&#10;&#10;Description generated with very high confidence">
+      <p:sp>
+        <p:nvSpPr>
+          <p:cNvPr id="2" name="Title 1">
             <a:extLst>
               <a:ext uri="{FF2B5EF4-FFF2-40B4-BE49-F238E27FC236}">
-                <a16:creationId xmlns:a16="http://schemas.microsoft.com/office/drawing/2014/main" id="{92C202E7-8607-4D8C-AD61-219BA88A9074}"/>
+                <a16:creationId xmlns:a16="http://schemas.microsoft.com/office/drawing/2014/main" id="{F716DD9B-F7D2-4287-98AE-F7F86AE565D6}"/>
               </a:ext>
             </a:extLst>
           </p:cNvPr>
-          <p:cNvPicPr>
-            <a:picLocks noChangeAspect="1"/>
-          </p:cNvPicPr>
-          <p:nvPr/>
-        </p:nvPicPr>
-        <p:blipFill>
-          <a:blip r:embed="rId2"/>
-          <a:stretch>
-            <a:fillRect/>
-          </a:stretch>
-        </p:blipFill>
-        <p:spPr>
-          <a:xfrm>
-            <a:off x="1564745" y="1591415"/>
-            <a:ext cx="9062509" cy="3675169"/>
-          </a:xfrm>
-          <a:prstGeom prst="rect">
-            <a:avLst/>
-          </a:prstGeom>
-        </p:spPr>
-      </p:pic>
+          <p:cNvSpPr>
+            <a:spLocks noGrp="1"/>
+          </p:cNvSpPr>
+          <p:nvPr>
+            <p:ph type="title"/>
+          </p:nvPr>
+        </p:nvSpPr>
+        <p:spPr/>
+        <p:txBody>
+          <a:bodyPr/>
+          <a:lstStyle/>
+          <a:p>
+            <a:r>
+              <a:rPr lang="en-US" dirty="0"/>
+              <a:t>Scanner </a:t>
+            </a:r>
+          </a:p>
+        </p:txBody>
+      </p:sp>
+      <p:sp>
+        <p:nvSpPr>
+          <p:cNvPr id="3" name="Text Placeholder 2">
+            <a:extLst>
+              <a:ext uri="{FF2B5EF4-FFF2-40B4-BE49-F238E27FC236}">
+                <a16:creationId xmlns:a16="http://schemas.microsoft.com/office/drawing/2014/main" id="{DC61E3B9-0220-4689-B1A3-FBD7648DF8BE}"/>
+              </a:ext>
+            </a:extLst>
+          </p:cNvPr>
+          <p:cNvSpPr>
+            <a:spLocks noGrp="1"/>
+          </p:cNvSpPr>
+          <p:nvPr>
+            <p:ph type="body" idx="1"/>
+          </p:nvPr>
+        </p:nvSpPr>
+        <p:spPr/>
+        <p:txBody>
+          <a:bodyPr/>
+          <a:lstStyle/>
+          <a:p>
+            <a:r>
+              <a:rPr lang="en-US" dirty="0"/>
+              <a:t>Goals</a:t>
+            </a:r>
+          </a:p>
+        </p:txBody>
+      </p:sp>
+      <p:sp>
+        <p:nvSpPr>
+          <p:cNvPr id="4" name="Content Placeholder 3">
+            <a:extLst>
+              <a:ext uri="{FF2B5EF4-FFF2-40B4-BE49-F238E27FC236}">
+                <a16:creationId xmlns:a16="http://schemas.microsoft.com/office/drawing/2014/main" id="{113B233D-CB85-4464-8C8E-378BF3781D3C}"/>
+              </a:ext>
+            </a:extLst>
+          </p:cNvPr>
+          <p:cNvSpPr>
+            <a:spLocks noGrp="1"/>
+          </p:cNvSpPr>
+          <p:nvPr>
+            <p:ph sz="half" idx="2"/>
+          </p:nvPr>
+        </p:nvSpPr>
+        <p:spPr/>
+        <p:txBody>
+          <a:bodyPr/>
+          <a:lstStyle/>
+          <a:p>
+            <a:r>
+              <a:rPr lang="en-US" dirty="0"/>
+              <a:t>Scanning the barcodes found on department inventory from a phone camera </a:t>
+            </a:r>
+          </a:p>
+          <a:p>
+            <a:r>
+              <a:rPr lang="en-US" dirty="0"/>
+              <a:t>Secondary goal: scanning barcodes from a PC</a:t>
+            </a:r>
+          </a:p>
+        </p:txBody>
+      </p:sp>
+      <p:sp>
+        <p:nvSpPr>
+          <p:cNvPr id="5" name="Text Placeholder 4">
+            <a:extLst>
+              <a:ext uri="{FF2B5EF4-FFF2-40B4-BE49-F238E27FC236}">
+                <a16:creationId xmlns:a16="http://schemas.microsoft.com/office/drawing/2014/main" id="{62BF2970-E608-4186-97CC-9D9ED5F69208}"/>
+              </a:ext>
+            </a:extLst>
+          </p:cNvPr>
+          <p:cNvSpPr>
+            <a:spLocks noGrp="1"/>
+          </p:cNvSpPr>
+          <p:nvPr>
+            <p:ph type="body" sz="quarter" idx="3"/>
+          </p:nvPr>
+        </p:nvSpPr>
+        <p:spPr/>
+        <p:txBody>
+          <a:bodyPr/>
+          <a:lstStyle/>
+          <a:p>
+            <a:r>
+              <a:rPr lang="en-US" dirty="0"/>
+              <a:t>Final State</a:t>
+            </a:r>
+          </a:p>
+        </p:txBody>
+      </p:sp>
+      <p:sp>
+        <p:nvSpPr>
+          <p:cNvPr id="6" name="Content Placeholder 5">
+            <a:extLst>
+              <a:ext uri="{FF2B5EF4-FFF2-40B4-BE49-F238E27FC236}">
+                <a16:creationId xmlns:a16="http://schemas.microsoft.com/office/drawing/2014/main" id="{7B0DA6A4-7943-48B5-8D83-2D2FB062D6E9}"/>
+              </a:ext>
+            </a:extLst>
+          </p:cNvPr>
+          <p:cNvSpPr>
+            <a:spLocks noGrp="1"/>
+          </p:cNvSpPr>
+          <p:nvPr>
+            <p:ph sz="quarter" idx="4"/>
+          </p:nvPr>
+        </p:nvSpPr>
+        <p:spPr/>
+        <p:txBody>
+          <a:bodyPr/>
+          <a:lstStyle/>
+          <a:p>
+            <a:r>
+              <a:rPr lang="en-US" dirty="0"/>
+              <a:t>On android scanning is handled by a call to the external app “Barcode Scanner”</a:t>
+            </a:r>
+          </a:p>
+          <a:p>
+            <a:r>
+              <a:rPr lang="en-US" dirty="0"/>
+              <a:t>On PC scanning is handled by a USB hand scanner </a:t>
+            </a:r>
+          </a:p>
+          <a:p>
+            <a:r>
+              <a:rPr lang="en-US" dirty="0"/>
+              <a:t>No scanning available on non android phones</a:t>
+            </a:r>
+          </a:p>
+        </p:txBody>
+      </p:sp>
     </p:spTree>
     <p:extLst>
       <p:ext uri="{BB962C8B-B14F-4D97-AF65-F5344CB8AC3E}">
-        <p14:creationId xmlns:p14="http://schemas.microsoft.com/office/powerpoint/2010/main" val="3467644512"/>
+        <p14:creationId xmlns:p14="http://schemas.microsoft.com/office/powerpoint/2010/main" val="4020540796"/>
       </p:ext>
     </p:extLst>
   </p:cSld>
@@ -7585,40 +7113,81 @@
           <a:chExt cx="0" cy="0"/>
         </a:xfrm>
       </p:grpSpPr>
-      <p:pic>
-        <p:nvPicPr>
-          <p:cNvPr id="3" name="Picture 2" descr="A screenshot of a social media post&#10;&#10;Description generated with very high confidence">
-            <a:extLst>
-              <a:ext uri="{FF2B5EF4-FFF2-40B4-BE49-F238E27FC236}">
-                <a16:creationId xmlns:a16="http://schemas.microsoft.com/office/drawing/2014/main" id="{1B63A0D7-8725-4874-A5CF-C0114290CF87}"/>
-              </a:ext>
-            </a:extLst>
-          </p:cNvPr>
-          <p:cNvPicPr>
-            <a:picLocks noChangeAspect="1"/>
-          </p:cNvPicPr>
-          <p:nvPr/>
-        </p:nvPicPr>
-        <p:blipFill>
-          <a:blip r:embed="rId2"/>
-          <a:stretch>
-            <a:fillRect/>
-          </a:stretch>
-        </p:blipFill>
-        <p:spPr>
-          <a:xfrm>
-            <a:off x="2175915" y="1428471"/>
-            <a:ext cx="7840169" cy="4001058"/>
-          </a:xfrm>
-          <a:prstGeom prst="rect">
-            <a:avLst/>
-          </a:prstGeom>
-        </p:spPr>
-      </p:pic>
+      <p:sp>
+        <p:nvSpPr>
+          <p:cNvPr id="2" name="Title 1"/>
+          <p:cNvSpPr>
+            <a:spLocks noGrp="1"/>
+          </p:cNvSpPr>
+          <p:nvPr>
+            <p:ph type="title"/>
+          </p:nvPr>
+        </p:nvSpPr>
+        <p:spPr/>
+        <p:txBody>
+          <a:bodyPr/>
+          <a:lstStyle/>
+          <a:p>
+            <a:r>
+              <a:rPr lang="en-US" dirty="0"/>
+              <a:t>Possible future work</a:t>
+            </a:r>
+          </a:p>
+        </p:txBody>
+      </p:sp>
+      <p:sp>
+        <p:nvSpPr>
+          <p:cNvPr id="3" name="Content Placeholder 2"/>
+          <p:cNvSpPr>
+            <a:spLocks noGrp="1"/>
+          </p:cNvSpPr>
+          <p:nvPr>
+            <p:ph idx="1"/>
+          </p:nvPr>
+        </p:nvSpPr>
+        <p:spPr/>
+        <p:txBody>
+          <a:bodyPr/>
+          <a:lstStyle/>
+          <a:p>
+            <a:r>
+              <a:rPr lang="en-US" dirty="0"/>
+              <a:t>Setting up a hosting server </a:t>
+            </a:r>
+          </a:p>
+          <a:p>
+            <a:r>
+              <a:rPr lang="en-US" dirty="0"/>
+              <a:t>Further optimizing the interface for mobile </a:t>
+            </a:r>
+          </a:p>
+          <a:p>
+            <a:r>
+              <a:rPr lang="en-US" dirty="0"/>
+              <a:t>Converting the data from the old system to this one</a:t>
+            </a:r>
+          </a:p>
+          <a:p>
+            <a:r>
+              <a:rPr lang="en-US" dirty="0"/>
+              <a:t>Adding a scanning option for IOS</a:t>
+            </a:r>
+          </a:p>
+          <a:p>
+            <a:pPr marL="0" indent="0">
+              <a:buNone/>
+            </a:pPr>
+            <a:endParaRPr lang="en-US" dirty="0"/>
+          </a:p>
+          <a:p>
+            <a:endParaRPr lang="en-US" dirty="0"/>
+          </a:p>
+        </p:txBody>
+      </p:sp>
     </p:spTree>
     <p:extLst>
       <p:ext uri="{BB962C8B-B14F-4D97-AF65-F5344CB8AC3E}">
-        <p14:creationId xmlns:p14="http://schemas.microsoft.com/office/powerpoint/2010/main" val="3577572757"/>
+        <p14:creationId xmlns:p14="http://schemas.microsoft.com/office/powerpoint/2010/main" val="1381390963"/>
       </p:ext>
     </p:extLst>
   </p:cSld>

</xml_diff>

<commit_message>
changed some stuff in powerpoint
</commit_message>
<xml_diff>
--- a/Inventory Management System final code review.pptx
+++ b/Inventory Management System final code review.pptx
@@ -6224,7 +6224,7 @@
           <a:p>
             <a:r>
               <a:rPr lang="en-US" dirty="0"/>
-              <a:t>Ability to scan barcodes of new inventory from a cellphone camera</a:t>
+              <a:t>Ability to scan barcodes of inventory from a cellphone camera</a:t>
             </a:r>
           </a:p>
           <a:p>
@@ -6424,19 +6424,19 @@
           <a:p>
             <a:r>
               <a:rPr lang="en-US" dirty="0"/>
-              <a:t>We were not able to test on mobile</a:t>
-            </a:r>
-          </a:p>
-          <a:p>
-            <a:r>
-              <a:rPr lang="en-US" dirty="0"/>
-              <a:t>All features are accusable and are easily accessible from the home page </a:t>
-            </a:r>
-          </a:p>
-          <a:p>
-            <a:r>
-              <a:rPr lang="en-US" dirty="0"/>
-              <a:t>Interface complies with und style guidelines </a:t>
+              <a:t>We were working on a test on mobile</a:t>
+            </a:r>
+          </a:p>
+          <a:p>
+            <a:r>
+              <a:rPr lang="en-US" dirty="0"/>
+              <a:t>All features are easily accessible from the home page </a:t>
+            </a:r>
+          </a:p>
+          <a:p>
+            <a:r>
+              <a:rPr lang="en-US" dirty="0"/>
+              <a:t>Interface complies with most basic und style guidelines </a:t>
             </a:r>
           </a:p>
           <a:p>
@@ -7066,7 +7066,15 @@
           <a:p>
             <a:r>
               <a:rPr lang="en-US" dirty="0"/>
-              <a:t>On android scanning is handled by a call to the external app “Barcode Scanner”</a:t>
+              <a:t>On android scanning is handled by a call to the external app “</a:t>
+            </a:r>
+            <a:r>
+              <a:rPr lang="en-US" dirty="0" err="1"/>
+              <a:t>Zxing</a:t>
+            </a:r>
+            <a:r>
+              <a:rPr lang="en-US" dirty="0"/>
+              <a:t> Barcode Scanner”</a:t>
             </a:r>
           </a:p>
           <a:p>
@@ -7159,6 +7167,12 @@
             <a:r>
               <a:rPr lang="en-US" dirty="0"/>
               <a:t>Further optimizing the interface for mobile </a:t>
+            </a:r>
+          </a:p>
+          <a:p>
+            <a:r>
+              <a:rPr lang="en-US" dirty="0"/>
+              <a:t>Adjusting the interface to follow more UND standards</a:t>
             </a:r>
           </a:p>
           <a:p>

</xml_diff>